<commit_message>
Actualización del Contenido de los Juegos
</commit_message>
<xml_diff>
--- a/18-data-visualization/Contenido Semana 1/2.6. Presentación - Instrucciones Juego.pptx
+++ b/18-data-visualization/Contenido Semana 1/2.6. Presentación - Instrucciones Juego.pptx
@@ -16,7 +16,7 @@
   <p:notesSz cx="6858000" cy="9144000"/>
   <p:embeddedFontLst>
     <p:embeddedFont>
-      <p:font typeface="Calibri" panose="020F0502020204030204" pitchFamily="34" charset="0"/>
+      <p:font typeface="Raleway" panose="020B0604020202020204" charset="0"/>
       <p:regular r:id="rId6"/>
       <p:bold r:id="rId7"/>
       <p:italic r:id="rId8"/>
@@ -30,7 +30,7 @@
       <p:boldItalic r:id="rId13"/>
     </p:embeddedFont>
     <p:embeddedFont>
-      <p:font typeface="Raleway" panose="020B0604020202020204" charset="0"/>
+      <p:font typeface="Calibri" panose="020F0502020204030204" pitchFamily="34" charset="0"/>
       <p:regular r:id="rId14"/>
       <p:bold r:id="rId15"/>
       <p:italic r:id="rId16"/>
@@ -10268,8 +10268,12 @@
               <a:buNone/>
             </a:pPr>
             <a:r>
+              <a:rPr lang="es-ES" sz="1850"/>
+              <a:t>- 8 </a:t>
+            </a:r>
+            <a:r>
               <a:rPr lang="es-ES" sz="1850" dirty="0"/>
-              <a:t>- 7 tarjetas donde se explican cada una de las agregaciones posibles, su definición y cómo calcularla. </a:t>
+              <a:t>tarjetas donde se explican cada una de las agregaciones posibles, su definición y cómo calcularla. </a:t>
             </a:r>
           </a:p>
           <a:p>

</xml_diff>